<commit_message>
Final final of the final
</commit_message>
<xml_diff>
--- a/Regression Models to Predict Progression of Parkinson’s.pptx
+++ b/Regression Models to Predict Progression of Parkinson’s.pptx
@@ -352,7 +352,7 @@
           <a:p>
             <a:fld id="{A5E38784-A5DC-4D1E-89BC-C49E540CA36C}" type="datetimeFigureOut">
               <a:rPr lang="en-US" smtClean="0"/>
-              <a:t>12/13/2019</a:t>
+              <a:t>12/17/2019</a:t>
             </a:fld>
             <a:endParaRPr lang="en-US"/>
           </a:p>
@@ -560,7 +560,7 @@
           <a:p>
             <a:fld id="{A5E38784-A5DC-4D1E-89BC-C49E540CA36C}" type="datetimeFigureOut">
               <a:rPr lang="en-US" smtClean="0"/>
-              <a:t>12/13/2019</a:t>
+              <a:t>12/17/2019</a:t>
             </a:fld>
             <a:endParaRPr lang="en-US"/>
           </a:p>
@@ -816,7 +816,7 @@
           <a:p>
             <a:fld id="{A5E38784-A5DC-4D1E-89BC-C49E540CA36C}" type="datetimeFigureOut">
               <a:rPr lang="en-US" smtClean="0"/>
-              <a:t>12/13/2019</a:t>
+              <a:t>12/17/2019</a:t>
             </a:fld>
             <a:endParaRPr lang="en-US"/>
           </a:p>
@@ -986,7 +986,7 @@
           <a:p>
             <a:fld id="{A5E38784-A5DC-4D1E-89BC-C49E540CA36C}" type="datetimeFigureOut">
               <a:rPr lang="en-US" smtClean="0"/>
-              <a:t>12/13/2019</a:t>
+              <a:t>12/17/2019</a:t>
             </a:fld>
             <a:endParaRPr lang="en-US"/>
           </a:p>
@@ -1329,7 +1329,7 @@
           <a:p>
             <a:fld id="{A5E38784-A5DC-4D1E-89BC-C49E540CA36C}" type="datetimeFigureOut">
               <a:rPr lang="en-US" smtClean="0"/>
-              <a:t>12/13/2019</a:t>
+              <a:t>12/17/2019</a:t>
             </a:fld>
             <a:endParaRPr lang="en-US"/>
           </a:p>
@@ -1604,7 +1604,7 @@
           <a:p>
             <a:fld id="{A5E38784-A5DC-4D1E-89BC-C49E540CA36C}" type="datetimeFigureOut">
               <a:rPr lang="en-US" smtClean="0"/>
-              <a:t>12/13/2019</a:t>
+              <a:t>12/17/2019</a:t>
             </a:fld>
             <a:endParaRPr lang="en-US"/>
           </a:p>
@@ -1983,7 +1983,7 @@
           <a:p>
             <a:fld id="{A5E38784-A5DC-4D1E-89BC-C49E540CA36C}" type="datetimeFigureOut">
               <a:rPr lang="en-US" smtClean="0"/>
-              <a:t>12/13/2019</a:t>
+              <a:t>12/17/2019</a:t>
             </a:fld>
             <a:endParaRPr lang="en-US"/>
           </a:p>
@@ -2101,7 +2101,7 @@
           <a:p>
             <a:fld id="{A5E38784-A5DC-4D1E-89BC-C49E540CA36C}" type="datetimeFigureOut">
               <a:rPr lang="en-US" smtClean="0"/>
-              <a:t>12/13/2019</a:t>
+              <a:t>12/17/2019</a:t>
             </a:fld>
             <a:endParaRPr lang="en-US"/>
           </a:p>
@@ -2272,7 +2272,7 @@
           <a:p>
             <a:fld id="{A5E38784-A5DC-4D1E-89BC-C49E540CA36C}" type="datetimeFigureOut">
               <a:rPr lang="en-US" smtClean="0"/>
-              <a:t>12/13/2019</a:t>
+              <a:t>12/17/2019</a:t>
             </a:fld>
             <a:endParaRPr lang="en-US"/>
           </a:p>
@@ -2626,7 +2626,7 @@
           <a:p>
             <a:fld id="{A5E38784-A5DC-4D1E-89BC-C49E540CA36C}" type="datetimeFigureOut">
               <a:rPr lang="en-US" smtClean="0"/>
-              <a:t>12/13/2019</a:t>
+              <a:t>12/17/2019</a:t>
             </a:fld>
             <a:endParaRPr lang="en-US"/>
           </a:p>
@@ -3003,7 +3003,7 @@
           <a:p>
             <a:fld id="{A5E38784-A5DC-4D1E-89BC-C49E540CA36C}" type="datetimeFigureOut">
               <a:rPr lang="en-US" smtClean="0"/>
-              <a:t>12/13/2019</a:t>
+              <a:t>12/17/2019</a:t>
             </a:fld>
             <a:endParaRPr lang="en-US"/>
           </a:p>
@@ -3290,7 +3290,7 @@
           <a:p>
             <a:fld id="{A5E38784-A5DC-4D1E-89BC-C49E540CA36C}" type="datetimeFigureOut">
               <a:rPr lang="en-US" smtClean="0"/>
-              <a:t>12/13/2019</a:t>
+              <a:t>12/17/2019</a:t>
             </a:fld>
             <a:endParaRPr lang="en-US"/>
           </a:p>
@@ -4758,15 +4758,7 @@
             </a:pPr>
             <a:r>
               <a:rPr lang="en-US" dirty="0"/>
-              <a:t> </a:t>
-            </a:r>
-            <a:r>
-              <a:rPr lang="en-US" dirty="0" err="1"/>
-              <a:t>Parkinsons</a:t>
-            </a:r>
-            <a:r>
-              <a:rPr lang="en-US" dirty="0"/>
-              <a:t>: disorder affecting movement and speech</a:t>
+              <a:t> Parkinson's: disorder affecting movement and speech</a:t>
             </a:r>
           </a:p>
           <a:p>

</xml_diff>